<commit_message>
Finished poster for BEB802
</commit_message>
<xml_diff>
--- a/BEB802/poster.pptx
+++ b/BEB802/poster.pptx
@@ -4565,6 +4565,823 @@
               <a:t>Add Video Functionality</a:t>
             </a:r>
             <a:endParaRPr lang="en-AU" sz="4400" dirty="0"/>
+          </a:p>
+        </p:txBody>
+      </p:sp>
+      <p:pic>
+        <p:nvPicPr>
+          <p:cNvPr id="8" name="Picture 7"/>
+          <p:cNvPicPr>
+            <a:picLocks noChangeAspect="1"/>
+          </p:cNvPicPr>
+          <p:nvPr/>
+        </p:nvPicPr>
+        <p:blipFill rotWithShape="1">
+          <a:blip r:embed="rId2"/>
+          <a:srcRect l="35081" t="14572" r="29845" b="9004"/>
+          <a:stretch/>
+        </p:blipFill>
+        <p:spPr>
+          <a:xfrm>
+            <a:off x="7309024" y="9636186"/>
+            <a:ext cx="2243630" cy="2751603"/>
+          </a:xfrm>
+          <a:prstGeom prst="rect">
+            <a:avLst/>
+          </a:prstGeom>
+        </p:spPr>
+      </p:pic>
+      <p:pic>
+        <p:nvPicPr>
+          <p:cNvPr id="9" name="Picture 8"/>
+          <p:cNvPicPr>
+            <a:picLocks noChangeAspect="1"/>
+          </p:cNvPicPr>
+          <p:nvPr/>
+        </p:nvPicPr>
+        <p:blipFill rotWithShape="1">
+          <a:blip r:embed="rId3"/>
+          <a:srcRect l="12310" t="11580" r="12895" b="10115"/>
+          <a:stretch/>
+        </p:blipFill>
+        <p:spPr>
+          <a:xfrm>
+            <a:off x="3132560" y="5850955"/>
+            <a:ext cx="5348023" cy="3132594"/>
+          </a:xfrm>
+          <a:prstGeom prst="rect">
+            <a:avLst/>
+          </a:prstGeom>
+        </p:spPr>
+      </p:pic>
+      <p:cxnSp>
+        <p:nvCxnSpPr>
+          <p:cNvPr id="11" name="Straight Arrow Connector 10"/>
+          <p:cNvCxnSpPr/>
+          <p:nvPr/>
+        </p:nvCxnSpPr>
+        <p:spPr>
+          <a:xfrm flipH="1" flipV="1">
+            <a:off x="6804968" y="7867179"/>
+            <a:ext cx="1368152" cy="1584176"/>
+          </a:xfrm>
+          <a:prstGeom prst="straightConnector1">
+            <a:avLst/>
+          </a:prstGeom>
+          <a:ln>
+            <a:tailEnd type="arrow"/>
+          </a:ln>
+        </p:spPr>
+        <p:style>
+          <a:lnRef idx="2">
+            <a:schemeClr val="accent1"/>
+          </a:lnRef>
+          <a:fillRef idx="0">
+            <a:schemeClr val="accent1"/>
+          </a:fillRef>
+          <a:effectRef idx="1">
+            <a:schemeClr val="accent1"/>
+          </a:effectRef>
+          <a:fontRef idx="minor">
+            <a:schemeClr val="tx1"/>
+          </a:fontRef>
+        </p:style>
+      </p:cxnSp>
+      <p:pic>
+        <p:nvPicPr>
+          <p:cNvPr id="14" name="Picture 13"/>
+          <p:cNvPicPr>
+            <a:picLocks noChangeAspect="1"/>
+          </p:cNvPicPr>
+          <p:nvPr/>
+        </p:nvPicPr>
+        <p:blipFill rotWithShape="1">
+          <a:blip r:embed="rId4"/>
+          <a:srcRect t="9785"/>
+          <a:stretch/>
+        </p:blipFill>
+        <p:spPr>
+          <a:xfrm>
+            <a:off x="1980432" y="10284258"/>
+            <a:ext cx="3098800" cy="2188334"/>
+          </a:xfrm>
+          <a:prstGeom prst="rect">
+            <a:avLst/>
+          </a:prstGeom>
+          <a:ln>
+            <a:solidFill>
+              <a:schemeClr val="tx1"/>
+            </a:solidFill>
+          </a:ln>
+        </p:spPr>
+      </p:pic>
+      <p:cxnSp>
+        <p:nvCxnSpPr>
+          <p:cNvPr id="15" name="Straight Arrow Connector 14"/>
+          <p:cNvCxnSpPr/>
+          <p:nvPr/>
+        </p:nvCxnSpPr>
+        <p:spPr>
+          <a:xfrm flipV="1">
+            <a:off x="3492600" y="8299227"/>
+            <a:ext cx="2088232" cy="1800200"/>
+          </a:xfrm>
+          <a:prstGeom prst="straightConnector1">
+            <a:avLst/>
+          </a:prstGeom>
+          <a:ln>
+            <a:tailEnd type="arrow"/>
+          </a:ln>
+        </p:spPr>
+        <p:style>
+          <a:lnRef idx="2">
+            <a:schemeClr val="accent1"/>
+          </a:lnRef>
+          <a:fillRef idx="0">
+            <a:schemeClr val="accent1"/>
+          </a:fillRef>
+          <a:effectRef idx="1">
+            <a:schemeClr val="accent1"/>
+          </a:effectRef>
+          <a:fontRef idx="minor">
+            <a:schemeClr val="tx1"/>
+          </a:fontRef>
+        </p:style>
+      </p:cxnSp>
+      <p:sp>
+        <p:nvSpPr>
+          <p:cNvPr id="17" name="TextBox 16"/>
+          <p:cNvSpPr txBox="1"/>
+          <p:nvPr/>
+        </p:nvSpPr>
+        <p:spPr>
+          <a:xfrm>
+            <a:off x="2124448" y="4482803"/>
+            <a:ext cx="7056784" cy="1015663"/>
+          </a:xfrm>
+          <a:prstGeom prst="rect">
+            <a:avLst/>
+          </a:prstGeom>
+          <a:noFill/>
+        </p:spPr>
+        <p:txBody>
+          <a:bodyPr wrap="square" rtlCol="0">
+            <a:spAutoFit/>
+          </a:bodyPr>
+          <a:lstStyle/>
+          <a:p>
+            <a:pPr algn="ctr"/>
+            <a:r>
+              <a:rPr lang="en-US" sz="2000" dirty="0" smtClean="0"/>
+              <a:t>Process of extracting entities from a source. In case of a video, there are many types of entities. The main entities SAIVT focuses on are faces and speakers</a:t>
+            </a:r>
+            <a:endParaRPr lang="en-US" sz="2000" dirty="0"/>
+          </a:p>
+        </p:txBody>
+      </p:sp>
+      <p:sp>
+        <p:nvSpPr>
+          <p:cNvPr id="20" name="TextBox 19"/>
+          <p:cNvSpPr txBox="1"/>
+          <p:nvPr/>
+        </p:nvSpPr>
+        <p:spPr>
+          <a:xfrm>
+            <a:off x="1548384" y="12547699"/>
+            <a:ext cx="4104456" cy="1938992"/>
+          </a:xfrm>
+          <a:prstGeom prst="rect">
+            <a:avLst/>
+          </a:prstGeom>
+          <a:noFill/>
+        </p:spPr>
+        <p:txBody>
+          <a:bodyPr wrap="square" rtlCol="0">
+            <a:spAutoFit/>
+          </a:bodyPr>
+          <a:lstStyle/>
+          <a:p>
+            <a:pPr algn="ctr"/>
+            <a:r>
+              <a:rPr lang="en-AU" sz="2000" dirty="0"/>
+              <a:t>Speaker </a:t>
+            </a:r>
+            <a:r>
+              <a:rPr lang="en-AU" sz="2000" dirty="0" smtClean="0"/>
+              <a:t>detection and </a:t>
+            </a:r>
+            <a:r>
+              <a:rPr lang="en-AU" sz="2000" dirty="0" err="1" smtClean="0"/>
+              <a:t>diarisation</a:t>
+            </a:r>
+            <a:r>
+              <a:rPr lang="en-AU" sz="2000" dirty="0" smtClean="0"/>
+              <a:t> </a:t>
+            </a:r>
+            <a:r>
+              <a:rPr lang="en-AU" sz="2000" dirty="0"/>
+              <a:t>is defined as not only detecting when an individual is speaking but moreover the identification of the person, the individual, who is speaking. </a:t>
+            </a:r>
+            <a:endParaRPr lang="en-US" sz="2000" dirty="0"/>
+          </a:p>
+        </p:txBody>
+      </p:sp>
+      <p:sp>
+        <p:nvSpPr>
+          <p:cNvPr id="21" name="TextBox 20"/>
+          <p:cNvSpPr txBox="1"/>
+          <p:nvPr/>
+        </p:nvSpPr>
+        <p:spPr>
+          <a:xfrm>
+            <a:off x="6732960" y="12547699"/>
+            <a:ext cx="3528392" cy="1631216"/>
+          </a:xfrm>
+          <a:prstGeom prst="rect">
+            <a:avLst/>
+          </a:prstGeom>
+          <a:noFill/>
+        </p:spPr>
+        <p:txBody>
+          <a:bodyPr wrap="square" rtlCol="0">
+            <a:spAutoFit/>
+          </a:bodyPr>
+          <a:lstStyle/>
+          <a:p>
+            <a:pPr algn="ctr"/>
+            <a:r>
+              <a:rPr lang="en-AU" sz="2000" dirty="0" smtClean="0"/>
+              <a:t>Face recognition is the process of detecting faces and assigning a particular identity to that face in order to link the same person over different still images</a:t>
+            </a:r>
+            <a:endParaRPr lang="en-US" sz="2000" dirty="0"/>
+          </a:p>
+        </p:txBody>
+      </p:sp>
+      <p:graphicFrame>
+        <p:nvGraphicFramePr>
+          <p:cNvPr id="24" name="Table 23"/>
+          <p:cNvGraphicFramePr>
+            <a:graphicFrameLocks noGrp="1"/>
+          </p:cNvGraphicFramePr>
+          <p:nvPr>
+            <p:extLst>
+              <p:ext uri="{D42A27DB-BD31-4B8C-83A1-F6EECF244321}">
+                <p14:modId xmlns:p14="http://schemas.microsoft.com/office/powerpoint/2010/main" val="3237750079"/>
+              </p:ext>
+            </p:extLst>
+          </p:nvPr>
+        </p:nvGraphicFramePr>
+        <p:xfrm>
+          <a:off x="10909424" y="4482803"/>
+          <a:ext cx="9361040" cy="10801201"/>
+        </p:xfrm>
+        <a:graphic>
+          <a:graphicData uri="http://schemas.openxmlformats.org/drawingml/2006/table">
+            <a:tbl>
+              <a:tblPr firstRow="1" bandRow="1">
+                <a:tableStyleId>{5940675A-B579-460E-94D1-54222C63F5DA}</a:tableStyleId>
+              </a:tblPr>
+              <a:tblGrid>
+                <a:gridCol w="4680520"/>
+                <a:gridCol w="4680520"/>
+              </a:tblGrid>
+              <a:tr h="1429738">
+                <a:tc>
+                  <a:txBody>
+                    <a:bodyPr/>
+                    <a:lstStyle/>
+                    <a:p>
+                      <a:pPr algn="ctr"/>
+                      <a:r>
+                        <a:rPr lang="en-US" dirty="0" smtClean="0"/>
+                        <a:t>OLD</a:t>
+                      </a:r>
+                      <a:endParaRPr lang="en-US" dirty="0"/>
+                    </a:p>
+                  </a:txBody>
+                  <a:tcPr/>
+                </a:tc>
+                <a:tc>
+                  <a:txBody>
+                    <a:bodyPr/>
+                    <a:lstStyle/>
+                    <a:p>
+                      <a:pPr algn="ctr"/>
+                      <a:r>
+                        <a:rPr lang="en-US" dirty="0" smtClean="0"/>
+                        <a:t>NEW</a:t>
+                      </a:r>
+                      <a:endParaRPr lang="en-US" dirty="0"/>
+                    </a:p>
+                  </a:txBody>
+                  <a:tcPr/>
+                </a:tc>
+              </a:tr>
+              <a:tr h="3123821">
+                <a:tc>
+                  <a:txBody>
+                    <a:bodyPr/>
+                    <a:lstStyle/>
+                    <a:p>
+                      <a:endParaRPr lang="en-US" dirty="0"/>
+                    </a:p>
+                  </a:txBody>
+                  <a:tcPr/>
+                </a:tc>
+                <a:tc>
+                  <a:txBody>
+                    <a:bodyPr/>
+                    <a:lstStyle/>
+                    <a:p>
+                      <a:endParaRPr lang="en-US" dirty="0"/>
+                    </a:p>
+                  </a:txBody>
+                  <a:tcPr/>
+                </a:tc>
+              </a:tr>
+              <a:tr h="3123821">
+                <a:tc>
+                  <a:txBody>
+                    <a:bodyPr/>
+                    <a:lstStyle/>
+                    <a:p>
+                      <a:endParaRPr lang="en-US" dirty="0"/>
+                    </a:p>
+                  </a:txBody>
+                  <a:tcPr/>
+                </a:tc>
+                <a:tc>
+                  <a:txBody>
+                    <a:bodyPr/>
+                    <a:lstStyle/>
+                    <a:p>
+                      <a:endParaRPr lang="en-US" dirty="0"/>
+                    </a:p>
+                  </a:txBody>
+                  <a:tcPr/>
+                </a:tc>
+              </a:tr>
+              <a:tr h="3123821">
+                <a:tc>
+                  <a:txBody>
+                    <a:bodyPr/>
+                    <a:lstStyle/>
+                    <a:p>
+                      <a:endParaRPr lang="en-US" dirty="0"/>
+                    </a:p>
+                  </a:txBody>
+                  <a:tcPr/>
+                </a:tc>
+                <a:tc>
+                  <a:txBody>
+                    <a:bodyPr/>
+                    <a:lstStyle/>
+                    <a:p>
+                      <a:endParaRPr lang="en-US" dirty="0"/>
+                    </a:p>
+                  </a:txBody>
+                  <a:tcPr/>
+                </a:tc>
+              </a:tr>
+            </a:tbl>
+          </a:graphicData>
+        </a:graphic>
+      </p:graphicFrame>
+      <p:pic>
+        <p:nvPicPr>
+          <p:cNvPr id="25" name="Picture 24" descr="E:\A-Uni\BEB801\ScreenshotsForProgressReport\StylingEnhancements\r7712\Screen Shot 2014-05-16 at 9.40.45 PM.png"/>
+          <p:cNvPicPr/>
+          <p:nvPr/>
+        </p:nvPicPr>
+        <p:blipFill>
+          <a:blip r:embed="rId5" cstate="print"/>
+          <a:srcRect/>
+          <a:stretch>
+            <a:fillRect/>
+          </a:stretch>
+        </p:blipFill>
+        <p:spPr bwMode="auto">
+          <a:xfrm>
+            <a:off x="11053440" y="6066979"/>
+            <a:ext cx="4536504" cy="2808312"/>
+          </a:xfrm>
+          <a:prstGeom prst="rect">
+            <a:avLst/>
+          </a:prstGeom>
+          <a:noFill/>
+          <a:ln>
+            <a:noFill/>
+          </a:ln>
+        </p:spPr>
+      </p:pic>
+      <p:pic>
+        <p:nvPicPr>
+          <p:cNvPr id="26" name="Picture 25" descr="E:\A-Uni\BEB801\ScreenshotsForProgressReport\StylingEnhancements\r7992\Screen Shot 2014-05-16 at 9.39.58 PM.png"/>
+          <p:cNvPicPr/>
+          <p:nvPr/>
+        </p:nvPicPr>
+        <p:blipFill>
+          <a:blip r:embed="rId6" cstate="print"/>
+          <a:srcRect/>
+          <a:stretch>
+            <a:fillRect/>
+          </a:stretch>
+        </p:blipFill>
+        <p:spPr bwMode="auto">
+          <a:xfrm>
+            <a:off x="15661952" y="6066979"/>
+            <a:ext cx="4536504" cy="2808312"/>
+          </a:xfrm>
+          <a:prstGeom prst="rect">
+            <a:avLst/>
+          </a:prstGeom>
+          <a:noFill/>
+          <a:ln>
+            <a:noFill/>
+          </a:ln>
+        </p:spPr>
+      </p:pic>
+      <p:pic>
+        <p:nvPicPr>
+          <p:cNvPr id="27" name="Picture 26" descr="E:\A-Uni\BEB801\ScreenshotsForProgressReport\StylingEnhancements\r7712\Screen Shot 2014-05-16 at 9.42.07 PM.png"/>
+          <p:cNvPicPr/>
+          <p:nvPr/>
+        </p:nvPicPr>
+        <p:blipFill>
+          <a:blip r:embed="rId7" cstate="print"/>
+          <a:srcRect l="8335" r="4782"/>
+          <a:stretch>
+            <a:fillRect/>
+          </a:stretch>
+        </p:blipFill>
+        <p:spPr bwMode="auto">
+          <a:xfrm>
+            <a:off x="10981432" y="9163323"/>
+            <a:ext cx="4536504" cy="2808312"/>
+          </a:xfrm>
+          <a:prstGeom prst="rect">
+            <a:avLst/>
+          </a:prstGeom>
+          <a:noFill/>
+          <a:ln>
+            <a:noFill/>
+          </a:ln>
+        </p:spPr>
+      </p:pic>
+      <p:pic>
+        <p:nvPicPr>
+          <p:cNvPr id="28" name="Picture 27" descr="E:\A-Uni\BEB801\ScreenshotsForProgressReport\StylingEnhancements\r7992\Screen Shot 2014-05-24 at 1.52.23 PM.png"/>
+          <p:cNvPicPr/>
+          <p:nvPr/>
+        </p:nvPicPr>
+        <p:blipFill>
+          <a:blip r:embed="rId8" cstate="print"/>
+          <a:srcRect/>
+          <a:stretch>
+            <a:fillRect/>
+          </a:stretch>
+        </p:blipFill>
+        <p:spPr bwMode="auto">
+          <a:xfrm>
+            <a:off x="15661952" y="9235331"/>
+            <a:ext cx="4536504" cy="2808312"/>
+          </a:xfrm>
+          <a:prstGeom prst="rect">
+            <a:avLst/>
+          </a:prstGeom>
+          <a:noFill/>
+          <a:ln>
+            <a:noFill/>
+          </a:ln>
+        </p:spPr>
+      </p:pic>
+      <p:pic>
+        <p:nvPicPr>
+          <p:cNvPr id="29" name="Picture 28" descr="E:\A-Uni\BEB801\ScreenshotsForProgressReport\StylingEnhancements\r7712\Screen Shot 2014-05-16 at 9.44.52 PM.png"/>
+          <p:cNvPicPr/>
+          <p:nvPr/>
+        </p:nvPicPr>
+        <p:blipFill>
+          <a:blip r:embed="rId9" cstate="print"/>
+          <a:srcRect/>
+          <a:stretch>
+            <a:fillRect/>
+          </a:stretch>
+        </p:blipFill>
+        <p:spPr bwMode="auto">
+          <a:xfrm>
+            <a:off x="10981431" y="12763723"/>
+            <a:ext cx="4536505" cy="1800225"/>
+          </a:xfrm>
+          <a:prstGeom prst="rect">
+            <a:avLst/>
+          </a:prstGeom>
+          <a:noFill/>
+          <a:ln>
+            <a:noFill/>
+          </a:ln>
+        </p:spPr>
+      </p:pic>
+      <p:pic>
+        <p:nvPicPr>
+          <p:cNvPr id="30" name="Picture 29" descr="E:\A-Uni\BEB801\ScreenshotsForProgressReport\StylingEnhancements\r7992\Screen Shot 2014-05-16 at 9.45.06 PM.png"/>
+          <p:cNvPicPr/>
+          <p:nvPr/>
+        </p:nvPicPr>
+        <p:blipFill>
+          <a:blip r:embed="rId10" cstate="print"/>
+          <a:srcRect/>
+          <a:stretch>
+            <a:fillRect/>
+          </a:stretch>
+        </p:blipFill>
+        <p:spPr bwMode="auto">
+          <a:xfrm>
+            <a:off x="15661953" y="12835731"/>
+            <a:ext cx="4536504" cy="1512168"/>
+          </a:xfrm>
+          <a:prstGeom prst="rect">
+            <a:avLst/>
+          </a:prstGeom>
+          <a:noFill/>
+          <a:ln>
+            <a:noFill/>
+          </a:ln>
+        </p:spPr>
+      </p:pic>
+      <p:pic>
+        <p:nvPicPr>
+          <p:cNvPr id="32" name="Picture 31"/>
+          <p:cNvPicPr>
+            <a:picLocks noChangeAspect="1"/>
+          </p:cNvPicPr>
+          <p:nvPr/>
+        </p:nvPicPr>
+        <p:blipFill>
+          <a:blip r:embed="rId11"/>
+          <a:stretch>
+            <a:fillRect/>
+          </a:stretch>
+        </p:blipFill>
+        <p:spPr>
+          <a:xfrm>
+            <a:off x="1620392" y="17084203"/>
+            <a:ext cx="6223242" cy="4248472"/>
+          </a:xfrm>
+          <a:prstGeom prst="rect">
+            <a:avLst/>
+          </a:prstGeom>
+        </p:spPr>
+      </p:pic>
+      <p:pic>
+        <p:nvPicPr>
+          <p:cNvPr id="33" name="Picture 32"/>
+          <p:cNvPicPr>
+            <a:picLocks noChangeAspect="1"/>
+          </p:cNvPicPr>
+          <p:nvPr/>
+        </p:nvPicPr>
+        <p:blipFill>
+          <a:blip r:embed="rId12"/>
+          <a:stretch>
+            <a:fillRect/>
+          </a:stretch>
+        </p:blipFill>
+        <p:spPr>
+          <a:xfrm>
+            <a:off x="3924648" y="21980747"/>
+            <a:ext cx="6310261" cy="5040560"/>
+          </a:xfrm>
+          <a:prstGeom prst="rect">
+            <a:avLst/>
+          </a:prstGeom>
+        </p:spPr>
+      </p:pic>
+      <p:pic>
+        <p:nvPicPr>
+          <p:cNvPr id="34" name="Picture 33" descr="E:\A-Uni\BEB801\ScreenshotsForProgressReport\AddVideo\r7992\Screen Shot 2014-05-16 at 10.03.34 PM.png"/>
+          <p:cNvPicPr/>
+          <p:nvPr/>
+        </p:nvPicPr>
+        <p:blipFill>
+          <a:blip r:embed="rId13" cstate="print"/>
+          <a:srcRect/>
+          <a:stretch>
+            <a:fillRect/>
+          </a:stretch>
+        </p:blipFill>
+        <p:spPr bwMode="auto">
+          <a:xfrm>
+            <a:off x="11341472" y="16868179"/>
+            <a:ext cx="8496944" cy="3096344"/>
+          </a:xfrm>
+          <a:prstGeom prst="rect">
+            <a:avLst/>
+          </a:prstGeom>
+          <a:noFill/>
+          <a:ln>
+            <a:solidFill>
+              <a:srgbClr val="000000"/>
+            </a:solidFill>
+          </a:ln>
+        </p:spPr>
+      </p:pic>
+      <p:pic>
+        <p:nvPicPr>
+          <p:cNvPr id="35" name="Picture 34" descr="E:\A-Uni\BEB801\ScreenshotsForProgressReport\AddVideo\r7992\Screen Shot 2014-05-16 at 10.06.22 PM.png"/>
+          <p:cNvPicPr/>
+          <p:nvPr/>
+        </p:nvPicPr>
+        <p:blipFill>
+          <a:blip r:embed="rId14" cstate="print"/>
+          <a:srcRect/>
+          <a:stretch>
+            <a:fillRect/>
+          </a:stretch>
+        </p:blipFill>
+        <p:spPr bwMode="auto">
+          <a:xfrm>
+            <a:off x="11413480" y="20396571"/>
+            <a:ext cx="8424936" cy="792088"/>
+          </a:xfrm>
+          <a:prstGeom prst="rect">
+            <a:avLst/>
+          </a:prstGeom>
+          <a:noFill/>
+          <a:ln>
+            <a:solidFill>
+              <a:srgbClr val="000000"/>
+            </a:solidFill>
+          </a:ln>
+        </p:spPr>
+      </p:pic>
+      <p:pic>
+        <p:nvPicPr>
+          <p:cNvPr id="36" name="Picture 35" descr="E:\A-Uni\BEB801\ScreenshotsForProgressReport\AddVideo\r7992\Screen Shot 2014-05-16 at 10.07.22 PM.png"/>
+          <p:cNvPicPr/>
+          <p:nvPr/>
+        </p:nvPicPr>
+        <p:blipFill>
+          <a:blip r:embed="rId15" cstate="print"/>
+          <a:srcRect/>
+          <a:stretch>
+            <a:fillRect/>
+          </a:stretch>
+        </p:blipFill>
+        <p:spPr bwMode="auto">
+          <a:xfrm>
+            <a:off x="11413480" y="21764723"/>
+            <a:ext cx="8424936" cy="864096"/>
+          </a:xfrm>
+          <a:prstGeom prst="rect">
+            <a:avLst/>
+          </a:prstGeom>
+          <a:noFill/>
+          <a:ln>
+            <a:solidFill>
+              <a:srgbClr val="000000"/>
+            </a:solidFill>
+          </a:ln>
+        </p:spPr>
+      </p:pic>
+      <p:pic>
+        <p:nvPicPr>
+          <p:cNvPr id="37" name="Picture 36" descr="E:\A-Uni\BEB801\ScreenshotsForProgressReport\AddVideo\r7992\Screen Shot 2014-05-16 at 10.09.41 PM.png"/>
+          <p:cNvPicPr/>
+          <p:nvPr/>
+        </p:nvPicPr>
+        <p:blipFill>
+          <a:blip r:embed="rId16" cstate="print"/>
+          <a:srcRect/>
+          <a:stretch>
+            <a:fillRect/>
+          </a:stretch>
+        </p:blipFill>
+        <p:spPr bwMode="auto">
+          <a:xfrm>
+            <a:off x="11413480" y="22916851"/>
+            <a:ext cx="8424936" cy="4392488"/>
+          </a:xfrm>
+          <a:prstGeom prst="rect">
+            <a:avLst/>
+          </a:prstGeom>
+          <a:noFill/>
+          <a:ln>
+            <a:solidFill>
+              <a:srgbClr val="000000"/>
+            </a:solidFill>
+          </a:ln>
+        </p:spPr>
+      </p:pic>
+      <p:sp>
+        <p:nvSpPr>
+          <p:cNvPr id="39" name="TextBox 38"/>
+          <p:cNvSpPr txBox="1"/>
+          <p:nvPr/>
+        </p:nvSpPr>
+        <p:spPr>
+          <a:xfrm>
+            <a:off x="6804968" y="17012195"/>
+            <a:ext cx="1080120" cy="1872208"/>
+          </a:xfrm>
+          <a:prstGeom prst="rect">
+            <a:avLst/>
+          </a:prstGeom>
+          <a:solidFill>
+            <a:srgbClr val="FFFFFF"/>
+          </a:solidFill>
+        </p:spPr>
+        <p:txBody>
+          <a:bodyPr wrap="square" rtlCol="0">
+            <a:spAutoFit/>
+          </a:bodyPr>
+          <a:lstStyle/>
+          <a:p>
+            <a:endParaRPr lang="en-US" dirty="0"/>
+          </a:p>
+        </p:txBody>
+      </p:sp>
+      <p:sp>
+        <p:nvSpPr>
+          <p:cNvPr id="40" name="TextBox 39"/>
+          <p:cNvSpPr txBox="1"/>
+          <p:nvPr/>
+        </p:nvSpPr>
+        <p:spPr>
+          <a:xfrm>
+            <a:off x="1548384" y="20684603"/>
+            <a:ext cx="3168352" cy="648072"/>
+          </a:xfrm>
+          <a:prstGeom prst="rect">
+            <a:avLst/>
+          </a:prstGeom>
+          <a:solidFill>
+            <a:srgbClr val="FFFFFF"/>
+          </a:solidFill>
+        </p:spPr>
+        <p:txBody>
+          <a:bodyPr wrap="square" rtlCol="0">
+            <a:spAutoFit/>
+          </a:bodyPr>
+          <a:lstStyle/>
+          <a:p>
+            <a:endParaRPr lang="en-US" dirty="0"/>
+          </a:p>
+        </p:txBody>
+      </p:sp>
+      <p:sp>
+        <p:nvSpPr>
+          <p:cNvPr id="41" name="TextBox 40"/>
+          <p:cNvSpPr txBox="1"/>
+          <p:nvPr/>
+        </p:nvSpPr>
+        <p:spPr>
+          <a:xfrm>
+            <a:off x="3492600" y="25077091"/>
+            <a:ext cx="2664296" cy="1944216"/>
+          </a:xfrm>
+          <a:prstGeom prst="rect">
+            <a:avLst/>
+          </a:prstGeom>
+          <a:solidFill>
+            <a:srgbClr val="FFFFFF"/>
+          </a:solidFill>
+        </p:spPr>
+        <p:txBody>
+          <a:bodyPr wrap="square" rtlCol="0">
+            <a:spAutoFit/>
+          </a:bodyPr>
+          <a:lstStyle/>
+          <a:p>
+            <a:endParaRPr lang="en-US" dirty="0"/>
+          </a:p>
+        </p:txBody>
+      </p:sp>
+      <p:sp>
+        <p:nvSpPr>
+          <p:cNvPr id="42" name="TextBox 41"/>
+          <p:cNvSpPr txBox="1"/>
+          <p:nvPr/>
+        </p:nvSpPr>
+        <p:spPr>
+          <a:xfrm>
+            <a:off x="8389144" y="21980747"/>
+            <a:ext cx="1872208" cy="2376264"/>
+          </a:xfrm>
+          <a:prstGeom prst="rect">
+            <a:avLst/>
+          </a:prstGeom>
+          <a:solidFill>
+            <a:srgbClr val="FFFFFF"/>
+          </a:solidFill>
+        </p:spPr>
+        <p:txBody>
+          <a:bodyPr wrap="square" rtlCol="0">
+            <a:spAutoFit/>
+          </a:bodyPr>
+          <a:lstStyle/>
+          <a:p>
+            <a:endParaRPr lang="en-US" dirty="0"/>
           </a:p>
         </p:txBody>
       </p:sp>

</xml_diff>

<commit_message>
Touch ups on poster
</commit_message>
<xml_diff>
--- a/BEB802/poster.pptx
+++ b/BEB802/poster.pptx
@@ -4963,7 +4963,7 @@
         <p:spPr bwMode="auto">
           <a:xfrm>
             <a:off x="11053440" y="6066979"/>
-            <a:ext cx="4536504" cy="2808312"/>
+            <a:ext cx="4464496" cy="2736304"/>
           </a:xfrm>
           <a:prstGeom prst="rect">
             <a:avLst/>
@@ -5230,7 +5230,7 @@
         </p:blipFill>
         <p:spPr bwMode="auto">
           <a:xfrm>
-            <a:off x="11413480" y="21116651"/>
+            <a:off x="11341472" y="21116651"/>
             <a:ext cx="4248472" cy="2520280"/>
           </a:xfrm>
           <a:prstGeom prst="rect">
@@ -5401,8 +5401,8 @@
         </p:blipFill>
         <p:spPr>
           <a:xfrm>
-            <a:off x="16094001" y="21620707"/>
-            <a:ext cx="1800200" cy="1224136"/>
+            <a:off x="16166008" y="21476691"/>
+            <a:ext cx="1728192" cy="1175171"/>
           </a:xfrm>
           <a:prstGeom prst="rect">
             <a:avLst/>
@@ -5446,7 +5446,7 @@
         </p:nvSpPr>
         <p:spPr>
           <a:xfrm>
-            <a:off x="11413480" y="23924963"/>
+            <a:off x="11341472" y="23924963"/>
             <a:ext cx="2160240" cy="3456384"/>
           </a:xfrm>
           <a:prstGeom prst="rect">
@@ -5490,7 +5490,7 @@
         </p:nvSpPr>
         <p:spPr>
           <a:xfrm>
-            <a:off x="11413480" y="23996971"/>
+            <a:off x="11341472" y="23996971"/>
             <a:ext cx="2160240" cy="369332"/>
           </a:xfrm>
           <a:prstGeom prst="rect">
@@ -5530,7 +5530,7 @@
         </p:nvSpPr>
         <p:spPr>
           <a:xfrm>
-            <a:off x="11701512" y="24800040"/>
+            <a:off x="11629504" y="24789059"/>
             <a:ext cx="1512168" cy="276999"/>
           </a:xfrm>
           <a:prstGeom prst="rect">
@@ -5570,7 +5570,7 @@
         </p:nvSpPr>
         <p:spPr>
           <a:xfrm>
-            <a:off x="11701512" y="26672250"/>
+            <a:off x="11629504" y="26661267"/>
             <a:ext cx="1512168" cy="276999"/>
           </a:xfrm>
           <a:prstGeom prst="rect">
@@ -5606,7 +5606,7 @@
         </p:nvCxnSpPr>
         <p:spPr>
           <a:xfrm>
-            <a:off x="11917536" y="25221107"/>
+            <a:off x="11845528" y="25221107"/>
             <a:ext cx="0" cy="1296144"/>
           </a:xfrm>
           <a:prstGeom prst="straightConnector1">
@@ -5672,8 +5672,8 @@
         </p:nvCxnSpPr>
         <p:spPr>
           <a:xfrm>
-            <a:off x="12133560" y="26517251"/>
-            <a:ext cx="720080" cy="0"/>
+            <a:off x="11989544" y="26517251"/>
+            <a:ext cx="864096" cy="0"/>
           </a:xfrm>
           <a:prstGeom prst="straightConnector1">
             <a:avLst/>
@@ -5705,7 +5705,7 @@
         </p:nvSpPr>
         <p:spPr>
           <a:xfrm>
-            <a:off x="12133560" y="26229219"/>
+            <a:off x="12061552" y="26229219"/>
             <a:ext cx="792088" cy="276999"/>
           </a:xfrm>
           <a:prstGeom prst="rect">
@@ -5735,7 +5735,7 @@
         </p:nvSpPr>
         <p:spPr>
           <a:xfrm>
-            <a:off x="11485488" y="25653155"/>
+            <a:off x="11413480" y="25653155"/>
             <a:ext cx="792088" cy="646331"/>
           </a:xfrm>
           <a:prstGeom prst="rect">

</xml_diff>

<commit_message>
Minor changes to the poster for BEB802
</commit_message>
<xml_diff>
--- a/BEB802/poster.pptx
+++ b/BEB802/poster.pptx
@@ -192,7 +192,7 @@
           <a:p>
             <a:fld id="{DE877330-3B7D-4BEF-B557-5B1AE0A3F7BE}" type="datetimeFigureOut">
               <a:rPr lang="en-AU" smtClean="0"/>
-              <a:t>27/10/2014</a:t>
+              <a:t>28/10/2014</a:t>
             </a:fld>
             <a:endParaRPr lang="en-AU"/>
           </a:p>
@@ -641,7 +641,7 @@
           <a:p>
             <a:fld id="{CBED62B7-A59C-49BA-8607-B67BC401B26A}" type="datetimeFigureOut">
               <a:rPr lang="en-AU" smtClean="0"/>
-              <a:t>27/10/2014</a:t>
+              <a:t>28/10/2014</a:t>
             </a:fld>
             <a:endParaRPr lang="en-AU"/>
           </a:p>
@@ -811,7 +811,7 @@
           <a:p>
             <a:fld id="{CBED62B7-A59C-49BA-8607-B67BC401B26A}" type="datetimeFigureOut">
               <a:rPr lang="en-AU" smtClean="0"/>
-              <a:t>27/10/2014</a:t>
+              <a:t>28/10/2014</a:t>
             </a:fld>
             <a:endParaRPr lang="en-AU"/>
           </a:p>
@@ -991,7 +991,7 @@
           <a:p>
             <a:fld id="{CBED62B7-A59C-49BA-8607-B67BC401B26A}" type="datetimeFigureOut">
               <a:rPr lang="en-AU" smtClean="0"/>
-              <a:t>27/10/2014</a:t>
+              <a:t>28/10/2014</a:t>
             </a:fld>
             <a:endParaRPr lang="en-AU"/>
           </a:p>
@@ -1161,7 +1161,7 @@
           <a:p>
             <a:fld id="{CBED62B7-A59C-49BA-8607-B67BC401B26A}" type="datetimeFigureOut">
               <a:rPr lang="en-AU" smtClean="0"/>
-              <a:t>27/10/2014</a:t>
+              <a:t>28/10/2014</a:t>
             </a:fld>
             <a:endParaRPr lang="en-AU"/>
           </a:p>
@@ -1407,7 +1407,7 @@
           <a:p>
             <a:fld id="{CBED62B7-A59C-49BA-8607-B67BC401B26A}" type="datetimeFigureOut">
               <a:rPr lang="en-AU" smtClean="0"/>
-              <a:t>27/10/2014</a:t>
+              <a:t>28/10/2014</a:t>
             </a:fld>
             <a:endParaRPr lang="en-AU"/>
           </a:p>
@@ -1695,7 +1695,7 @@
           <a:p>
             <a:fld id="{CBED62B7-A59C-49BA-8607-B67BC401B26A}" type="datetimeFigureOut">
               <a:rPr lang="en-AU" smtClean="0"/>
-              <a:t>27/10/2014</a:t>
+              <a:t>28/10/2014</a:t>
             </a:fld>
             <a:endParaRPr lang="en-AU"/>
           </a:p>
@@ -2122,7 +2122,7 @@
           <a:p>
             <a:fld id="{CBED62B7-A59C-49BA-8607-B67BC401B26A}" type="datetimeFigureOut">
               <a:rPr lang="en-AU" smtClean="0"/>
-              <a:t>27/10/2014</a:t>
+              <a:t>28/10/2014</a:t>
             </a:fld>
             <a:endParaRPr lang="en-AU"/>
           </a:p>
@@ -2240,7 +2240,7 @@
           <a:p>
             <a:fld id="{CBED62B7-A59C-49BA-8607-B67BC401B26A}" type="datetimeFigureOut">
               <a:rPr lang="en-AU" smtClean="0"/>
-              <a:t>27/10/2014</a:t>
+              <a:t>28/10/2014</a:t>
             </a:fld>
             <a:endParaRPr lang="en-AU"/>
           </a:p>
@@ -2335,7 +2335,7 @@
           <a:p>
             <a:fld id="{CBED62B7-A59C-49BA-8607-B67BC401B26A}" type="datetimeFigureOut">
               <a:rPr lang="en-AU" smtClean="0"/>
-              <a:t>27/10/2014</a:t>
+              <a:t>28/10/2014</a:t>
             </a:fld>
             <a:endParaRPr lang="en-AU"/>
           </a:p>
@@ -2612,7 +2612,7 @@
           <a:p>
             <a:fld id="{CBED62B7-A59C-49BA-8607-B67BC401B26A}" type="datetimeFigureOut">
               <a:rPr lang="en-AU" smtClean="0"/>
-              <a:t>27/10/2014</a:t>
+              <a:t>28/10/2014</a:t>
             </a:fld>
             <a:endParaRPr lang="en-AU"/>
           </a:p>
@@ -2865,7 +2865,7 @@
           <a:p>
             <a:fld id="{CBED62B7-A59C-49BA-8607-B67BC401B26A}" type="datetimeFigureOut">
               <a:rPr lang="en-AU" smtClean="0"/>
-              <a:t>27/10/2014</a:t>
+              <a:t>28/10/2014</a:t>
             </a:fld>
             <a:endParaRPr lang="en-AU"/>
           </a:p>
@@ -3078,7 +3078,7 @@
           <a:p>
             <a:fld id="{CBED62B7-A59C-49BA-8607-B67BC401B26A}" type="datetimeFigureOut">
               <a:rPr lang="en-AU" smtClean="0"/>
-              <a:t>27/10/2014</a:t>
+              <a:t>28/10/2014</a:t>
             </a:fld>
             <a:endParaRPr lang="en-AU"/>
           </a:p>
@@ -3761,8 +3761,8 @@
         </p:nvSpPr>
         <p:spPr>
           <a:xfrm>
-            <a:off x="1069340" y="3096765"/>
-            <a:ext cx="9445837" cy="12276000"/>
+            <a:off x="612280" y="3096765"/>
+            <a:ext cx="9902897" cy="12276000"/>
           </a:xfrm>
           <a:prstGeom prst="rect">
             <a:avLst/>
@@ -3961,7 +3961,7 @@
         <p:spPr>
           <a:xfrm>
             <a:off x="10871623" y="3096765"/>
-            <a:ext cx="9445837" cy="12276000"/>
+            <a:ext cx="9830889" cy="12276000"/>
           </a:xfrm>
           <a:prstGeom prst="rect">
             <a:avLst/>
@@ -4117,7 +4117,7 @@
             </a:pPr>
             <a:r>
               <a:rPr lang="en-AU" sz="4400" dirty="0" smtClean="0"/>
-              <a:t>General Enhancements</a:t>
+              <a:t> General Enhancements</a:t>
             </a:r>
             <a:endParaRPr lang="en-AU" sz="4400" dirty="0"/>
           </a:p>
@@ -4206,8 +4206,8 @@
         </p:nvSpPr>
         <p:spPr>
           <a:xfrm>
-            <a:off x="1069340" y="15681411"/>
-            <a:ext cx="9445837" cy="12276000"/>
+            <a:off x="612280" y="15681411"/>
+            <a:ext cx="9902897" cy="12276000"/>
           </a:xfrm>
           <a:prstGeom prst="rect">
             <a:avLst/>
@@ -4406,7 +4406,7 @@
         <p:spPr>
           <a:xfrm>
             <a:off x="10871623" y="15681411"/>
-            <a:ext cx="9445837" cy="12276000"/>
+            <a:ext cx="9830889" cy="12276000"/>
           </a:xfrm>
           <a:prstGeom prst="rect">
             <a:avLst/>
@@ -4562,7 +4562,7 @@
             </a:pPr>
             <a:r>
               <a:rPr lang="en-AU" sz="4400" dirty="0" smtClean="0"/>
-              <a:t>Add Video Functionality</a:t>
+              <a:t> Add Video Functionality</a:t>
             </a:r>
             <a:endParaRPr lang="en-AU" sz="4400" dirty="0"/>
           </a:p>
@@ -4606,7 +4606,7 @@
         </p:blipFill>
         <p:spPr>
           <a:xfrm>
-            <a:off x="3132560" y="5850955"/>
+            <a:off x="2772520" y="5850955"/>
             <a:ext cx="5348023" cy="3132594"/>
           </a:xfrm>
           <a:prstGeom prst="rect">
@@ -4622,8 +4622,8 @@
         </p:nvCxnSpPr>
         <p:spPr>
           <a:xfrm flipH="1" flipV="1">
-            <a:off x="6804968" y="7867179"/>
-            <a:ext cx="1368152" cy="1584176"/>
+            <a:off x="6444928" y="7795171"/>
+            <a:ext cx="1800200" cy="1656184"/>
           </a:xfrm>
           <a:prstGeom prst="straightConnector1">
             <a:avLst/>
@@ -4662,7 +4662,7 @@
         </p:blipFill>
         <p:spPr>
           <a:xfrm>
-            <a:off x="1980432" y="10284258"/>
+            <a:off x="1548384" y="10243443"/>
             <a:ext cx="3098800" cy="2188334"/>
           </a:xfrm>
           <a:prstGeom prst="rect">
@@ -4683,8 +4683,8 @@
         </p:nvCxnSpPr>
         <p:spPr>
           <a:xfrm flipV="1">
-            <a:off x="3492600" y="8299227"/>
-            <a:ext cx="2088232" cy="1800200"/>
+            <a:off x="3204568" y="8299227"/>
+            <a:ext cx="2016224" cy="1728192"/>
           </a:xfrm>
           <a:prstGeom prst="straightConnector1">
             <a:avLst/>
@@ -4716,7 +4716,7 @@
         </p:nvSpPr>
         <p:spPr>
           <a:xfrm>
-            <a:off x="2124448" y="4482803"/>
+            <a:off x="1908424" y="4554811"/>
             <a:ext cx="7056784" cy="1015663"/>
           </a:xfrm>
           <a:prstGeom prst="rect">
@@ -4747,7 +4747,7 @@
         </p:nvSpPr>
         <p:spPr>
           <a:xfrm>
-            <a:off x="1548384" y="12547699"/>
+            <a:off x="1044328" y="12506884"/>
             <a:ext cx="4104456" cy="1938992"/>
           </a:xfrm>
           <a:prstGeom prst="rect">
@@ -4826,14 +4826,14 @@
           <p:nvPr>
             <p:extLst>
               <p:ext uri="{D42A27DB-BD31-4B8C-83A1-F6EECF244321}">
-                <p14:modId xmlns:p14="http://schemas.microsoft.com/office/powerpoint/2010/main" val="3237750079"/>
+                <p14:modId xmlns:p14="http://schemas.microsoft.com/office/powerpoint/2010/main" val="1008650637"/>
               </p:ext>
             </p:extLst>
           </p:nvPr>
         </p:nvGraphicFramePr>
         <p:xfrm>
           <a:off x="10909424" y="4482803"/>
-          <a:ext cx="9361040" cy="10801201"/>
+          <a:ext cx="9793088" cy="10873207"/>
         </p:xfrm>
         <a:graphic>
           <a:graphicData uri="http://schemas.openxmlformats.org/drawingml/2006/table">
@@ -4842,10 +4842,10 @@
                 <a:tableStyleId>{5940675A-B579-460E-94D1-54222C63F5DA}</a:tableStyleId>
               </a:tblPr>
               <a:tblGrid>
-                <a:gridCol w="4680520"/>
-                <a:gridCol w="4680520"/>
+                <a:gridCol w="4896544"/>
+                <a:gridCol w="4896544"/>
               </a:tblGrid>
-              <a:tr h="1429738">
+              <a:tr h="1439269">
                 <a:tc>
                   <a:txBody>
                     <a:bodyPr/>
@@ -4877,7 +4877,7 @@
                   <a:tcPr/>
                 </a:tc>
               </a:tr>
-              <a:tr h="3123821">
+              <a:tr h="3144646">
                 <a:tc>
                   <a:txBody>
                     <a:bodyPr/>
@@ -4899,7 +4899,7 @@
                   <a:tcPr/>
                 </a:tc>
               </a:tr>
-              <a:tr h="3123821">
+              <a:tr h="3144646">
                 <a:tc>
                   <a:txBody>
                     <a:bodyPr/>
@@ -4921,7 +4921,7 @@
                   <a:tcPr/>
                 </a:tc>
               </a:tr>
-              <a:tr h="3123821">
+              <a:tr h="3144646">
                 <a:tc>
                   <a:txBody>
                     <a:bodyPr/>
@@ -4989,7 +4989,7 @@
         </p:blipFill>
         <p:spPr bwMode="auto">
           <a:xfrm>
-            <a:off x="15661952" y="6066979"/>
+            <a:off x="16021992" y="6066979"/>
             <a:ext cx="4536504" cy="2808312"/>
           </a:xfrm>
           <a:prstGeom prst="rect">
@@ -5016,7 +5016,7 @@
         </p:blipFill>
         <p:spPr bwMode="auto">
           <a:xfrm>
-            <a:off x="10981432" y="9163323"/>
+            <a:off x="11125448" y="9163323"/>
             <a:ext cx="4536504" cy="2808312"/>
           </a:xfrm>
           <a:prstGeom prst="rect">
@@ -5043,7 +5043,7 @@
         </p:blipFill>
         <p:spPr bwMode="auto">
           <a:xfrm>
-            <a:off x="15661952" y="9235331"/>
+            <a:off x="16021992" y="9235331"/>
             <a:ext cx="4536504" cy="2808312"/>
           </a:xfrm>
           <a:prstGeom prst="rect">
@@ -5070,7 +5070,7 @@
         </p:blipFill>
         <p:spPr bwMode="auto">
           <a:xfrm>
-            <a:off x="10981431" y="12763723"/>
+            <a:off x="11053439" y="12763723"/>
             <a:ext cx="4536505" cy="1800225"/>
           </a:xfrm>
           <a:prstGeom prst="rect">
@@ -5097,7 +5097,7 @@
         </p:blipFill>
         <p:spPr bwMode="auto">
           <a:xfrm>
-            <a:off x="15661953" y="12835731"/>
+            <a:off x="16021992" y="12835731"/>
             <a:ext cx="4536504" cy="1512168"/>
           </a:xfrm>
           <a:prstGeom prst="rect">
@@ -5125,7 +5125,7 @@
         </p:blipFill>
         <p:spPr>
           <a:xfrm>
-            <a:off x="1620392" y="17084203"/>
+            <a:off x="972320" y="17084203"/>
             <a:ext cx="6223242" cy="4248472"/>
           </a:xfrm>
           <a:prstGeom prst="rect">
@@ -5173,7 +5173,7 @@
         <p:spPr bwMode="auto">
           <a:xfrm>
             <a:off x="11341472" y="16868179"/>
-            <a:ext cx="8496944" cy="3096344"/>
+            <a:ext cx="8712968" cy="3096344"/>
           </a:xfrm>
           <a:prstGeom prst="rect">
             <a:avLst/>
@@ -5202,7 +5202,7 @@
         <p:spPr bwMode="auto">
           <a:xfrm>
             <a:off x="11341472" y="20108539"/>
-            <a:ext cx="8424936" cy="792088"/>
+            <a:ext cx="8712968" cy="792088"/>
           </a:xfrm>
           <a:prstGeom prst="rect">
             <a:avLst/>
@@ -5252,7 +5252,7 @@
         </p:nvSpPr>
         <p:spPr>
           <a:xfrm>
-            <a:off x="6804968" y="17012195"/>
+            <a:off x="6228904" y="17012195"/>
             <a:ext cx="1080120" cy="1872208"/>
           </a:xfrm>
           <a:prstGeom prst="rect">
@@ -5280,7 +5280,7 @@
         </p:nvSpPr>
         <p:spPr>
           <a:xfrm>
-            <a:off x="1548384" y="20684603"/>
+            <a:off x="900312" y="20684603"/>
             <a:ext cx="3168352" cy="648072"/>
           </a:xfrm>
           <a:prstGeom prst="rect">
@@ -5372,7 +5372,7 @@
         <p:spPr bwMode="auto">
           <a:xfrm>
             <a:off x="16021992" y="21116651"/>
-            <a:ext cx="3744416" cy="2520280"/>
+            <a:ext cx="4032448" cy="2520280"/>
           </a:xfrm>
           <a:prstGeom prst="rect">
             <a:avLst/>
@@ -5402,7 +5402,7 @@
         <p:spPr>
           <a:xfrm>
             <a:off x="16166008" y="21476691"/>
-            <a:ext cx="1728192" cy="1175171"/>
+            <a:ext cx="1872208" cy="1175171"/>
           </a:xfrm>
           <a:prstGeom prst="rect">
             <a:avLst/>
@@ -5426,7 +5426,7 @@
         <p:spPr>
           <a:xfrm>
             <a:off x="13789744" y="23924963"/>
-            <a:ext cx="5976664" cy="3469356"/>
+            <a:ext cx="6264696" cy="3469356"/>
           </a:xfrm>
           <a:prstGeom prst="rect">
             <a:avLst/>
@@ -5812,7 +5812,7 @@
         </p:nvSpPr>
         <p:spPr>
           <a:xfrm>
-            <a:off x="7813080" y="17084203"/>
+            <a:off x="7525048" y="17084203"/>
             <a:ext cx="2664296" cy="3477875"/>
           </a:xfrm>
           <a:prstGeom prst="rect">
@@ -5843,7 +5843,7 @@
         </p:nvSpPr>
         <p:spPr>
           <a:xfrm>
-            <a:off x="1188344" y="22628819"/>
+            <a:off x="900312" y="22628819"/>
             <a:ext cx="2664296" cy="3170099"/>
           </a:xfrm>
           <a:prstGeom prst="rect">

</xml_diff>